<commit_message>
finalized ppt and added pdf version
</commit_message>
<xml_diff>
--- a/presentation_materials/ece143-final_presentation.pptx
+++ b/presentation_materials/ece143-final_presentation.pptx
@@ -19314,7 +19314,7 @@
 </file>
 
 <file path=ppt/slides/slide25.xml><?xml version="1.0" encoding="utf-8"?>
-<p:sld xmlns:a="http://schemas.openxmlformats.org/drawingml/2006/main" xmlns:r="http://schemas.openxmlformats.org/officeDocument/2006/relationships" xmlns:p="http://schemas.openxmlformats.org/presentationml/2006/main" show="0">
+<p:sld xmlns:a="http://schemas.openxmlformats.org/drawingml/2006/main" xmlns:r="http://schemas.openxmlformats.org/officeDocument/2006/relationships" xmlns:p="http://schemas.openxmlformats.org/presentationml/2006/main">
   <p:cSld>
     <p:spTree>
       <p:nvGrpSpPr>
@@ -19510,7 +19510,7 @@
 </file>
 
 <file path=ppt/slides/slide26.xml><?xml version="1.0" encoding="utf-8"?>
-<p:sld xmlns:a="http://schemas.openxmlformats.org/drawingml/2006/main" xmlns:r="http://schemas.openxmlformats.org/officeDocument/2006/relationships" xmlns:p="http://schemas.openxmlformats.org/presentationml/2006/main" show="0">
+<p:sld xmlns:a="http://schemas.openxmlformats.org/drawingml/2006/main" xmlns:r="http://schemas.openxmlformats.org/officeDocument/2006/relationships" xmlns:p="http://schemas.openxmlformats.org/presentationml/2006/main">
   <p:cSld>
     <p:spTree>
       <p:nvGrpSpPr>
@@ -19704,7 +19704,7 @@
 </file>
 
 <file path=ppt/slides/slide27.xml><?xml version="1.0" encoding="utf-8"?>
-<p:sld xmlns:a="http://schemas.openxmlformats.org/drawingml/2006/main" xmlns:r="http://schemas.openxmlformats.org/officeDocument/2006/relationships" xmlns:p="http://schemas.openxmlformats.org/presentationml/2006/main" show="0">
+<p:sld xmlns:a="http://schemas.openxmlformats.org/drawingml/2006/main" xmlns:r="http://schemas.openxmlformats.org/officeDocument/2006/relationships" xmlns:p="http://schemas.openxmlformats.org/presentationml/2006/main">
   <p:cSld>
     <p:spTree>
       <p:nvGrpSpPr>
@@ -20046,7 +20046,7 @@
 </file>
 
 <file path=ppt/slides/slide28.xml><?xml version="1.0" encoding="utf-8"?>
-<p:sld xmlns:a="http://schemas.openxmlformats.org/drawingml/2006/main" xmlns:r="http://schemas.openxmlformats.org/officeDocument/2006/relationships" xmlns:p="http://schemas.openxmlformats.org/presentationml/2006/main" show="0">
+<p:sld xmlns:a="http://schemas.openxmlformats.org/drawingml/2006/main" xmlns:r="http://schemas.openxmlformats.org/officeDocument/2006/relationships" xmlns:p="http://schemas.openxmlformats.org/presentationml/2006/main">
   <p:cSld>
     <p:spTree>
       <p:nvGrpSpPr>
@@ -20392,7 +20392,7 @@
 </file>
 
 <file path=ppt/slides/slide29.xml><?xml version="1.0" encoding="utf-8"?>
-<p:sld xmlns:a="http://schemas.openxmlformats.org/drawingml/2006/main" xmlns:r="http://schemas.openxmlformats.org/officeDocument/2006/relationships" xmlns:p="http://schemas.openxmlformats.org/presentationml/2006/main" show="0">
+<p:sld xmlns:a="http://schemas.openxmlformats.org/drawingml/2006/main" xmlns:r="http://schemas.openxmlformats.org/officeDocument/2006/relationships" xmlns:p="http://schemas.openxmlformats.org/presentationml/2006/main">
   <p:cSld>
     <p:spTree>
       <p:nvGrpSpPr>
@@ -23262,60 +23262,6 @@
       </p:pic>
       <p:sp>
         <p:nvSpPr>
-          <p:cNvPr id="8" name="Title 1">
-            <a:extLst>
-              <a:ext uri="{FF2B5EF4-FFF2-40B4-BE49-F238E27FC236}">
-                <a16:creationId xmlns:a16="http://schemas.microsoft.com/office/drawing/2014/main" id="{C6D93648-A8E6-2103-9564-7C0E4E1B8C91}"/>
-              </a:ext>
-            </a:extLst>
-          </p:cNvPr>
-          <p:cNvSpPr txBox="1">
-            <a:spLocks/>
-          </p:cNvSpPr>
-          <p:nvPr/>
-        </p:nvSpPr>
-        <p:spPr>
-          <a:xfrm>
-            <a:off x="8582917" y="1096297"/>
-            <a:ext cx="3265212" cy="1352397"/>
-          </a:xfrm>
-          <a:prstGeom prst="rect">
-            <a:avLst/>
-          </a:prstGeom>
-        </p:spPr>
-        <p:txBody>
-          <a:bodyPr>
-            <a:normAutofit/>
-          </a:bodyPr>
-          <a:lstStyle>
-            <a:lvl1pPr algn="l" defTabSz="914400" rtl="0" eaLnBrk="1" latinLnBrk="0" hangingPunct="1">
-              <a:lnSpc>
-                <a:spcPct val="100000"/>
-              </a:lnSpc>
-              <a:spcBef>
-                <a:spcPct val="0"/>
-              </a:spcBef>
-              <a:buNone/>
-              <a:defRPr sz="4000" kern="1200" cap="all" spc="30" baseline="0">
-                <a:solidFill>
-                  <a:schemeClr val="tx1"/>
-                </a:solidFill>
-                <a:latin typeface="Verdana" panose="020B0604030504040204" pitchFamily="34" charset="0"/>
-                <a:ea typeface="Verdana" panose="020B0604030504040204" pitchFamily="34" charset="0"/>
-                <a:cs typeface="+mj-cs"/>
-              </a:defRPr>
-            </a:lvl1pPr>
-          </a:lstStyle>
-          <a:p>
-            <a:r>
-              <a:rPr lang="en-US" dirty="0"/>
-              <a:t>IMPACT OF BMI</a:t>
-            </a:r>
-          </a:p>
-        </p:txBody>
-      </p:sp>
-      <p:sp>
-        <p:nvSpPr>
           <p:cNvPr id="9" name="Content Placeholder 36">
             <a:extLst>
               <a:ext uri="{FF2B5EF4-FFF2-40B4-BE49-F238E27FC236}">
@@ -23531,6 +23477,61 @@
               <a:buChar char="§"/>
             </a:pPr>
             <a:endParaRPr lang="en-US" dirty="0"/>
+          </a:p>
+        </p:txBody>
+      </p:sp>
+      <p:sp>
+        <p:nvSpPr>
+          <p:cNvPr id="3" name="Title 1">
+            <a:extLst>
+              <a:ext uri="{FF2B5EF4-FFF2-40B4-BE49-F238E27FC236}">
+                <a16:creationId xmlns:a16="http://schemas.microsoft.com/office/drawing/2014/main" id="{FE20AA9B-FDC2-5B1F-CE8E-CFCA2052EA19}"/>
+              </a:ext>
+            </a:extLst>
+          </p:cNvPr>
+          <p:cNvSpPr txBox="1">
+            <a:spLocks/>
+          </p:cNvSpPr>
+          <p:nvPr/>
+        </p:nvSpPr>
+        <p:spPr>
+          <a:xfrm>
+            <a:off x="8620586" y="1096297"/>
+            <a:ext cx="3265212" cy="1352397"/>
+          </a:xfrm>
+          <a:prstGeom prst="rect">
+            <a:avLst/>
+          </a:prstGeom>
+        </p:spPr>
+        <p:txBody>
+          <a:bodyPr>
+            <a:normAutofit/>
+          </a:bodyPr>
+          <a:lstStyle>
+            <a:lvl1pPr algn="l" defTabSz="914400" rtl="0" eaLnBrk="1" latinLnBrk="0" hangingPunct="1">
+              <a:lnSpc>
+                <a:spcPct val="100000"/>
+              </a:lnSpc>
+              <a:spcBef>
+                <a:spcPct val="0"/>
+              </a:spcBef>
+              <a:buNone/>
+              <a:defRPr sz="4000" kern="1200" cap="all" spc="30" baseline="0">
+                <a:solidFill>
+                  <a:schemeClr val="tx1"/>
+                </a:solidFill>
+                <a:latin typeface="Verdana" panose="020B0604030504040204" pitchFamily="34" charset="0"/>
+                <a:ea typeface="Verdana" panose="020B0604030504040204" pitchFamily="34" charset="0"/>
+                <a:cs typeface="+mj-cs"/>
+              </a:defRPr>
+            </a:lvl1pPr>
+          </a:lstStyle>
+          <a:p>
+            <a:pPr algn="ctr"/>
+            <a:r>
+              <a:rPr lang="en-US" dirty="0"/>
+              <a:t>IMPACT OF BMI</a:t>
+            </a:r>
           </a:p>
         </p:txBody>
       </p:sp>
@@ -24405,15 +24406,6 @@
 </file>
 
 <file path=customXml/item2.xml><?xml version="1.0" encoding="utf-8"?>
-<?mso-contentType ?>
-<FormTemplates xmlns="http://schemas.microsoft.com/sharepoint/v3/contenttype/forms">
-  <Display>DocumentLibraryForm</Display>
-  <Edit>DocumentLibraryForm</Edit>
-  <New>DocumentLibraryForm</New>
-</FormTemplates>
-</file>
-
-<file path=customXml/item3.xml><?xml version="1.0" encoding="utf-8"?>
 <ct:contentTypeSchema xmlns:ct="http://schemas.microsoft.com/office/2006/metadata/contentType" xmlns:ma="http://schemas.microsoft.com/office/2006/metadata/properties/metaAttributes" ct:_="" ma:_="" ma:contentTypeName="Document" ma:contentTypeID="0x010100C12ECD6C40FCB548A2F070481B8D2BE4" ma:contentTypeVersion="6" ma:contentTypeDescription="Create a new document." ma:contentTypeScope="" ma:versionID="9e4ec0c945ce08b2ab3ab2cc40be4cf6">
   <xsd:schema xmlns:xsd="http://www.w3.org/2001/XMLSchema" xmlns:xs="http://www.w3.org/2001/XMLSchema" xmlns:p="http://schemas.microsoft.com/office/2006/metadata/properties" xmlns:ns3="667e26b5-248a-4389-a65f-951c5a9bab3c" targetNamespace="http://schemas.microsoft.com/office/2006/metadata/properties" ma:root="true" ma:fieldsID="5df20083d56dd8e42f9ec60ccdc9b8a6" ns3:_="">
     <xsd:import namespace="667e26b5-248a-4389-a65f-951c5a9bab3c"/>
@@ -24571,31 +24563,32 @@
 </ct:contentTypeSchema>
 </file>
 
+<file path=customXml/item3.xml><?xml version="1.0" encoding="utf-8"?>
+<?mso-contentType ?>
+<FormTemplates xmlns="http://schemas.microsoft.com/sharepoint/v3/contenttype/forms">
+  <Display>DocumentLibraryForm</Display>
+  <Edit>DocumentLibraryForm</Edit>
+  <New>DocumentLibraryForm</New>
+</FormTemplates>
+</file>
+
 <file path=customXml/itemProps1.xml><?xml version="1.0" encoding="utf-8"?>
 <ds:datastoreItem xmlns:ds="http://schemas.openxmlformats.org/officeDocument/2006/customXml" ds:itemID="{B6F1018E-E76A-4D3C-87B4-1B7F78A0FE21}">
   <ds:schemaRefs>
+    <ds:schemaRef ds:uri="http://www.w3.org/XML/1998/namespace"/>
+    <ds:schemaRef ds:uri="http://purl.org/dc/dcmitype/"/>
+    <ds:schemaRef ds:uri="667e26b5-248a-4389-a65f-951c5a9bab3c"/>
     <ds:schemaRef ds:uri="http://purl.org/dc/elements/1.1/"/>
+    <ds:schemaRef ds:uri="http://schemas.microsoft.com/office/2006/documentManagement/types"/>
     <ds:schemaRef ds:uri="http://schemas.microsoft.com/office/2006/metadata/properties"/>
-    <ds:schemaRef ds:uri="http://www.w3.org/XML/1998/namespace"/>
-    <ds:schemaRef ds:uri="http://schemas.microsoft.com/office/2006/documentManagement/types"/>
-    <ds:schemaRef ds:uri="http://purl.org/dc/dcmitype/"/>
+    <ds:schemaRef ds:uri="http://purl.org/dc/terms/"/>
     <ds:schemaRef ds:uri="http://schemas.microsoft.com/office/infopath/2007/PartnerControls"/>
     <ds:schemaRef ds:uri="http://schemas.openxmlformats.org/package/2006/metadata/core-properties"/>
-    <ds:schemaRef ds:uri="667e26b5-248a-4389-a65f-951c5a9bab3c"/>
-    <ds:schemaRef ds:uri="http://purl.org/dc/terms/"/>
   </ds:schemaRefs>
 </ds:datastoreItem>
 </file>
 
 <file path=customXml/itemProps2.xml><?xml version="1.0" encoding="utf-8"?>
-<ds:datastoreItem xmlns:ds="http://schemas.openxmlformats.org/officeDocument/2006/customXml" ds:itemID="{21196880-332C-4F5A-9898-176DAAE03C5B}">
-  <ds:schemaRefs>
-    <ds:schemaRef ds:uri="http://schemas.microsoft.com/sharepoint/v3/contenttype/forms"/>
-  </ds:schemaRefs>
-</ds:datastoreItem>
-</file>
-
-<file path=customXml/itemProps3.xml><?xml version="1.0" encoding="utf-8"?>
 <ds:datastoreItem xmlns:ds="http://schemas.openxmlformats.org/officeDocument/2006/customXml" ds:itemID="{02B1956C-3C53-482E-BB50-017B98ABDE68}">
   <ds:schemaRefs>
     <ds:schemaRef ds:uri="http://schemas.microsoft.com/office/2006/metadata/contentType"/>
@@ -24611,4 +24604,12 @@
     <ds:schemaRef ds:uri="http://schemas.microsoft.com/internal/obd"/>
   </ds:schemaRefs>
 </ds:datastoreItem>
+</file>
+
+<file path=customXml/itemProps3.xml><?xml version="1.0" encoding="utf-8"?>
+<ds:datastoreItem xmlns:ds="http://schemas.openxmlformats.org/officeDocument/2006/customXml" ds:itemID="{21196880-332C-4F5A-9898-176DAAE03C5B}">
+  <ds:schemaRefs>
+    <ds:schemaRef ds:uri="http://schemas.microsoft.com/sharepoint/v3/contenttype/forms"/>
+  </ds:schemaRefs>
+</ds:datastoreItem>
 </file>
</xml_diff>

<commit_message>
caught small error in ppt, updated
</commit_message>
<xml_diff>
--- a/presentation_materials/ece143-final_presentation.pptx
+++ b/presentation_materials/ece143-final_presentation.pptx
@@ -22467,6 +22467,135 @@
           </a:p>
         </p:txBody>
       </p:sp>
+      <p:sp>
+        <p:nvSpPr>
+          <p:cNvPr id="8" name="Footer Placeholder 6">
+            <a:extLst>
+              <a:ext uri="{FF2B5EF4-FFF2-40B4-BE49-F238E27FC236}">
+                <a16:creationId xmlns:a16="http://schemas.microsoft.com/office/drawing/2014/main" id="{2792414A-DE88-0AA3-FA1F-A5C5C88553BA}"/>
+              </a:ext>
+            </a:extLst>
+          </p:cNvPr>
+          <p:cNvSpPr txBox="1">
+            <a:spLocks/>
+          </p:cNvSpPr>
+          <p:nvPr/>
+        </p:nvSpPr>
+        <p:spPr>
+          <a:xfrm>
+            <a:off x="9947911" y="6380956"/>
+            <a:ext cx="1780166" cy="268287"/>
+          </a:xfrm>
+          <a:prstGeom prst="rect">
+            <a:avLst/>
+          </a:prstGeom>
+        </p:spPr>
+        <p:txBody>
+          <a:bodyPr/>
+          <a:lstStyle>
+            <a:defPPr>
+              <a:defRPr lang="en-US"/>
+            </a:defPPr>
+            <a:lvl1pPr marL="0" algn="l" defTabSz="914400" rtl="0" eaLnBrk="1" latinLnBrk="0" hangingPunct="1">
+              <a:defRPr sz="1800" kern="1200">
+                <a:solidFill>
+                  <a:schemeClr val="tx1"/>
+                </a:solidFill>
+                <a:latin typeface="+mn-lt"/>
+                <a:ea typeface="+mn-ea"/>
+                <a:cs typeface="+mn-cs"/>
+              </a:defRPr>
+            </a:lvl1pPr>
+            <a:lvl2pPr marL="457200" algn="l" defTabSz="914400" rtl="0" eaLnBrk="1" latinLnBrk="0" hangingPunct="1">
+              <a:defRPr sz="1800" kern="1200">
+                <a:solidFill>
+                  <a:schemeClr val="tx1"/>
+                </a:solidFill>
+                <a:latin typeface="+mn-lt"/>
+                <a:ea typeface="+mn-ea"/>
+                <a:cs typeface="+mn-cs"/>
+              </a:defRPr>
+            </a:lvl2pPr>
+            <a:lvl3pPr marL="914400" algn="l" defTabSz="914400" rtl="0" eaLnBrk="1" latinLnBrk="0" hangingPunct="1">
+              <a:defRPr sz="1800" kern="1200">
+                <a:solidFill>
+                  <a:schemeClr val="tx1"/>
+                </a:solidFill>
+                <a:latin typeface="+mn-lt"/>
+                <a:ea typeface="+mn-ea"/>
+                <a:cs typeface="+mn-cs"/>
+              </a:defRPr>
+            </a:lvl3pPr>
+            <a:lvl4pPr marL="1371600" algn="l" defTabSz="914400" rtl="0" eaLnBrk="1" latinLnBrk="0" hangingPunct="1">
+              <a:defRPr sz="1800" kern="1200">
+                <a:solidFill>
+                  <a:schemeClr val="tx1"/>
+                </a:solidFill>
+                <a:latin typeface="+mn-lt"/>
+                <a:ea typeface="+mn-ea"/>
+                <a:cs typeface="+mn-cs"/>
+              </a:defRPr>
+            </a:lvl4pPr>
+            <a:lvl5pPr marL="1828800" algn="l" defTabSz="914400" rtl="0" eaLnBrk="1" latinLnBrk="0" hangingPunct="1">
+              <a:defRPr sz="1800" kern="1200">
+                <a:solidFill>
+                  <a:schemeClr val="tx1"/>
+                </a:solidFill>
+                <a:latin typeface="+mn-lt"/>
+                <a:ea typeface="+mn-ea"/>
+                <a:cs typeface="+mn-cs"/>
+              </a:defRPr>
+            </a:lvl5pPr>
+            <a:lvl6pPr marL="2286000" algn="l" defTabSz="914400" rtl="0" eaLnBrk="1" latinLnBrk="0" hangingPunct="1">
+              <a:defRPr sz="1800" kern="1200">
+                <a:solidFill>
+                  <a:schemeClr val="tx1"/>
+                </a:solidFill>
+                <a:latin typeface="+mn-lt"/>
+                <a:ea typeface="+mn-ea"/>
+                <a:cs typeface="+mn-cs"/>
+              </a:defRPr>
+            </a:lvl6pPr>
+            <a:lvl7pPr marL="2743200" algn="l" defTabSz="914400" rtl="0" eaLnBrk="1" latinLnBrk="0" hangingPunct="1">
+              <a:defRPr sz="1800" kern="1200">
+                <a:solidFill>
+                  <a:schemeClr val="tx1"/>
+                </a:solidFill>
+                <a:latin typeface="+mn-lt"/>
+                <a:ea typeface="+mn-ea"/>
+                <a:cs typeface="+mn-cs"/>
+              </a:defRPr>
+            </a:lvl7pPr>
+            <a:lvl8pPr marL="3200400" algn="l" defTabSz="914400" rtl="0" eaLnBrk="1" latinLnBrk="0" hangingPunct="1">
+              <a:defRPr sz="1800" kern="1200">
+                <a:solidFill>
+                  <a:schemeClr val="tx1"/>
+                </a:solidFill>
+                <a:latin typeface="+mn-lt"/>
+                <a:ea typeface="+mn-ea"/>
+                <a:cs typeface="+mn-cs"/>
+              </a:defRPr>
+            </a:lvl8pPr>
+            <a:lvl9pPr marL="3657600" algn="l" defTabSz="914400" rtl="0" eaLnBrk="1" latinLnBrk="0" hangingPunct="1">
+              <a:defRPr sz="1800" kern="1200">
+                <a:solidFill>
+                  <a:schemeClr val="tx1"/>
+                </a:solidFill>
+                <a:latin typeface="+mn-lt"/>
+                <a:ea typeface="+mn-ea"/>
+                <a:cs typeface="+mn-cs"/>
+              </a:defRPr>
+            </a:lvl9pPr>
+          </a:lstStyle>
+          <a:p>
+            <a:pPr algn="r"/>
+            <a:r>
+              <a:rPr lang="en-US" sz="1100" dirty="0"/>
+              <a:t>Physical Characteristics</a:t>
+            </a:r>
+          </a:p>
+        </p:txBody>
+      </p:sp>
     </p:spTree>
     <p:extLst>
       <p:ext uri="{BB962C8B-B14F-4D97-AF65-F5344CB8AC3E}">
@@ -24406,6 +24535,15 @@
 </file>
 
 <file path=customXml/item2.xml><?xml version="1.0" encoding="utf-8"?>
+<?mso-contentType ?>
+<FormTemplates xmlns="http://schemas.microsoft.com/sharepoint/v3/contenttype/forms">
+  <Display>DocumentLibraryForm</Display>
+  <Edit>DocumentLibraryForm</Edit>
+  <New>DocumentLibraryForm</New>
+</FormTemplates>
+</file>
+
+<file path=customXml/item3.xml><?xml version="1.0" encoding="utf-8"?>
 <ct:contentTypeSchema xmlns:ct="http://schemas.microsoft.com/office/2006/metadata/contentType" xmlns:ma="http://schemas.microsoft.com/office/2006/metadata/properties/metaAttributes" ct:_="" ma:_="" ma:contentTypeName="Document" ma:contentTypeID="0x010100C12ECD6C40FCB548A2F070481B8D2BE4" ma:contentTypeVersion="6" ma:contentTypeDescription="Create a new document." ma:contentTypeScope="" ma:versionID="9e4ec0c945ce08b2ab3ab2cc40be4cf6">
   <xsd:schema xmlns:xsd="http://www.w3.org/2001/XMLSchema" xmlns:xs="http://www.w3.org/2001/XMLSchema" xmlns:p="http://schemas.microsoft.com/office/2006/metadata/properties" xmlns:ns3="667e26b5-248a-4389-a65f-951c5a9bab3c" targetNamespace="http://schemas.microsoft.com/office/2006/metadata/properties" ma:root="true" ma:fieldsID="5df20083d56dd8e42f9ec60ccdc9b8a6" ns3:_="">
     <xsd:import namespace="667e26b5-248a-4389-a65f-951c5a9bab3c"/>
@@ -24563,32 +24701,31 @@
 </ct:contentTypeSchema>
 </file>
 
-<file path=customXml/item3.xml><?xml version="1.0" encoding="utf-8"?>
-<?mso-contentType ?>
-<FormTemplates xmlns="http://schemas.microsoft.com/sharepoint/v3/contenttype/forms">
-  <Display>DocumentLibraryForm</Display>
-  <Edit>DocumentLibraryForm</Edit>
-  <New>DocumentLibraryForm</New>
-</FormTemplates>
-</file>
-
 <file path=customXml/itemProps1.xml><?xml version="1.0" encoding="utf-8"?>
 <ds:datastoreItem xmlns:ds="http://schemas.openxmlformats.org/officeDocument/2006/customXml" ds:itemID="{B6F1018E-E76A-4D3C-87B4-1B7F78A0FE21}">
   <ds:schemaRefs>
+    <ds:schemaRef ds:uri="http://schemas.openxmlformats.org/package/2006/metadata/core-properties"/>
+    <ds:schemaRef ds:uri="http://purl.org/dc/terms/"/>
+    <ds:schemaRef ds:uri="http://purl.org/dc/dcmitype/"/>
+    <ds:schemaRef ds:uri="http://schemas.microsoft.com/office/infopath/2007/PartnerControls"/>
     <ds:schemaRef ds:uri="http://www.w3.org/XML/1998/namespace"/>
-    <ds:schemaRef ds:uri="http://purl.org/dc/dcmitype/"/>
+    <ds:schemaRef ds:uri="http://schemas.microsoft.com/office/2006/documentManagement/types"/>
+    <ds:schemaRef ds:uri="http://purl.org/dc/elements/1.1/"/>
     <ds:schemaRef ds:uri="667e26b5-248a-4389-a65f-951c5a9bab3c"/>
-    <ds:schemaRef ds:uri="http://purl.org/dc/elements/1.1/"/>
-    <ds:schemaRef ds:uri="http://schemas.microsoft.com/office/2006/documentManagement/types"/>
     <ds:schemaRef ds:uri="http://schemas.microsoft.com/office/2006/metadata/properties"/>
-    <ds:schemaRef ds:uri="http://purl.org/dc/terms/"/>
-    <ds:schemaRef ds:uri="http://schemas.microsoft.com/office/infopath/2007/PartnerControls"/>
-    <ds:schemaRef ds:uri="http://schemas.openxmlformats.org/package/2006/metadata/core-properties"/>
   </ds:schemaRefs>
 </ds:datastoreItem>
 </file>
 
 <file path=customXml/itemProps2.xml><?xml version="1.0" encoding="utf-8"?>
+<ds:datastoreItem xmlns:ds="http://schemas.openxmlformats.org/officeDocument/2006/customXml" ds:itemID="{21196880-332C-4F5A-9898-176DAAE03C5B}">
+  <ds:schemaRefs>
+    <ds:schemaRef ds:uri="http://schemas.microsoft.com/sharepoint/v3/contenttype/forms"/>
+  </ds:schemaRefs>
+</ds:datastoreItem>
+</file>
+
+<file path=customXml/itemProps3.xml><?xml version="1.0" encoding="utf-8"?>
 <ds:datastoreItem xmlns:ds="http://schemas.openxmlformats.org/officeDocument/2006/customXml" ds:itemID="{02B1956C-3C53-482E-BB50-017B98ABDE68}">
   <ds:schemaRefs>
     <ds:schemaRef ds:uri="http://schemas.microsoft.com/office/2006/metadata/contentType"/>
@@ -24604,12 +24741,4 @@
     <ds:schemaRef ds:uri="http://schemas.microsoft.com/internal/obd"/>
   </ds:schemaRefs>
 </ds:datastoreItem>
-</file>
-
-<file path=customXml/itemProps3.xml><?xml version="1.0" encoding="utf-8"?>
-<ds:datastoreItem xmlns:ds="http://schemas.openxmlformats.org/officeDocument/2006/customXml" ds:itemID="{21196880-332C-4F5A-9898-176DAAE03C5B}">
-  <ds:schemaRefs>
-    <ds:schemaRef ds:uri="http://schemas.microsoft.com/sharepoint/v3/contenttype/forms"/>
-  </ds:schemaRefs>
-</ds:datastoreItem>
 </file>
</xml_diff>